<commit_message>
Corrected Confluence URL for DB
</commit_message>
<xml_diff>
--- a/Week2_2025_DB.pptx
+++ b/Week2_2025_DB.pptx
@@ -4486,7 +4486,7 @@
         <p:spPr>
           <a:xfrm>
             <a:off x="1660137" y="2301016"/>
-            <a:ext cx="10090429" cy="2790764"/>
+            <a:ext cx="10090429" cy="3483261"/>
           </a:xfrm>
           <a:prstGeom prst="rect">
             <a:avLst/>
@@ -4538,6 +4538,20 @@
               </a:lnSpc>
             </a:pPr>
             <a:r>
+              <a:rPr lang="en-US" sz="3000" dirty="0">
+                <a:hlinkClick r:id="rId3"/>
+              </a:rPr>
+              <a:t>https://feit-teaching.atlassian.net/wiki/home</a:t>
+            </a:r>
+            <a:endParaRPr lang="en-US" sz="3000" dirty="0"/>
+          </a:p>
+          <a:p>
+            <a:pPr>
+              <a:lnSpc>
+                <a:spcPct val="150000"/>
+              </a:lnSpc>
+            </a:pPr>
+            <a:r>
               <a:rPr lang="en-US" sz="3000" dirty="0"/>
               <a:t>GitHub – for project tracking and source code repository</a:t>
             </a:r>
@@ -4559,10 +4573,10 @@
           <p:nvPr/>
         </p:nvPicPr>
         <p:blipFill>
-          <a:blip r:embed="rId3">
+          <a:blip r:embed="rId4">
             <a:extLst>
               <a:ext uri="{96DAC541-7B7A-43D3-8B79-37D633B846F1}">
-                <asvg:svgBlip xmlns:asvg="http://schemas.microsoft.com/office/drawing/2016/SVG/main" r:embed="rId4"/>
+                <asvg:svgBlip xmlns:asvg="http://schemas.microsoft.com/office/drawing/2016/SVG/main" r:embed="rId5"/>
               </a:ext>
             </a:extLst>
           </a:blip>
@@ -4595,10 +4609,10 @@
           <p:nvPr/>
         </p:nvPicPr>
         <p:blipFill>
-          <a:blip r:embed="rId3">
+          <a:blip r:embed="rId4">
             <a:extLst>
               <a:ext uri="{96DAC541-7B7A-43D3-8B79-37D633B846F1}">
-                <asvg:svgBlip xmlns:asvg="http://schemas.microsoft.com/office/drawing/2016/SVG/main" r:embed="rId4"/>
+                <asvg:svgBlip xmlns:asvg="http://schemas.microsoft.com/office/drawing/2016/SVG/main" r:embed="rId5"/>
               </a:ext>
             </a:extLst>
           </a:blip>
@@ -4631,10 +4645,10 @@
           <p:nvPr/>
         </p:nvPicPr>
         <p:blipFill>
-          <a:blip r:embed="rId3">
+          <a:blip r:embed="rId4">
             <a:extLst>
               <a:ext uri="{96DAC541-7B7A-43D3-8B79-37D633B846F1}">
-                <asvg:svgBlip xmlns:asvg="http://schemas.microsoft.com/office/drawing/2016/SVG/main" r:embed="rId4"/>
+                <asvg:svgBlip xmlns:asvg="http://schemas.microsoft.com/office/drawing/2016/SVG/main" r:embed="rId5"/>
               </a:ext>
             </a:extLst>
           </a:blip>
@@ -4667,10 +4681,10 @@
           <p:nvPr/>
         </p:nvPicPr>
         <p:blipFill>
-          <a:blip r:embed="rId3">
+          <a:blip r:embed="rId4">
             <a:extLst>
               <a:ext uri="{96DAC541-7B7A-43D3-8B79-37D633B846F1}">
-                <asvg:svgBlip xmlns:asvg="http://schemas.microsoft.com/office/drawing/2016/SVG/main" r:embed="rId4"/>
+                <asvg:svgBlip xmlns:asvg="http://schemas.microsoft.com/office/drawing/2016/SVG/main" r:embed="rId5"/>
               </a:ext>
             </a:extLst>
           </a:blip>
@@ -4680,7 +4694,7 @@
         </p:blipFill>
         <p:spPr>
           <a:xfrm>
-            <a:off x="532903" y="4254062"/>
+            <a:off x="543413" y="4979277"/>
             <a:ext cx="914400" cy="914400"/>
           </a:xfrm>
           <a:prstGeom prst="rect">

</xml_diff>